<commit_message>
Setup of environment and running applications included.
</commit_message>
<xml_diff>
--- a/Amazon Bedrock.pptx
+++ b/Amazon Bedrock.pptx
@@ -5,7 +5,7 @@
     <p:sldMasterId id="2147483648" r:id="rId1"/>
   </p:sldMasterIdLst>
   <p:notesMasterIdLst>
-    <p:notesMasterId r:id="rId18"/>
+    <p:notesMasterId r:id="rId19"/>
   </p:notesMasterIdLst>
   <p:sldIdLst>
     <p:sldId id="256" r:id="rId2"/>
@@ -24,6 +24,7 @@
     <p:sldId id="257" r:id="rId15"/>
     <p:sldId id="272" r:id="rId16"/>
     <p:sldId id="262" r:id="rId17"/>
+    <p:sldId id="273" r:id="rId18"/>
   </p:sldIdLst>
   <p:sldSz cx="12192000" cy="6858000"/>
   <p:notesSz cx="6858000" cy="9144000"/>
@@ -1866,10 +1867,10 @@
         <a:lstStyle/>
         <a:p>
           <a:r>
-            <a:rPr lang="en-US" b="0" i="0"/>
+            <a:rPr lang="en-US" b="0" i="0" dirty="0"/>
             <a:t>Overall more than 6 years in the field of State of the Art Technology</a:t>
           </a:r>
-          <a:endParaRPr lang="en-US"/>
+          <a:endParaRPr lang="en-US" dirty="0"/>
         </a:p>
       </dgm:t>
     </dgm:pt>
@@ -2896,10 +2897,10 @@
             <a:buNone/>
           </a:pPr>
           <a:r>
-            <a:rPr lang="en-US" sz="1600" b="0" i="0" kern="1200"/>
+            <a:rPr lang="en-US" sz="1600" b="0" i="0" kern="1200" dirty="0"/>
             <a:t>Overall more than 6 years in the field of State of the Art Technology</a:t>
           </a:r>
-          <a:endParaRPr lang="en-US" sz="1600" kern="1200"/>
+          <a:endParaRPr lang="en-US" sz="1600" kern="1200" dirty="0"/>
         </a:p>
       </dsp:txBody>
       <dsp:txXfrm>
@@ -5960,7 +5961,7 @@
           <a:p>
             <a:fld id="{DA50A3B3-E82C-BE40-BDA1-0F4EF064EABD}" type="datetimeFigureOut">
               <a:rPr lang="en-AE" smtClean="0"/>
-              <a:t>09/08/2024</a:t>
+              <a:t>12/08/2024</a:t>
             </a:fld>
             <a:endParaRPr lang="en-AE"/>
           </a:p>
@@ -6557,7 +6558,7 @@
           <a:p>
             <a:fld id="{24070C6D-87F8-C443-B9BB-9ABCDC43E77A}" type="datetimeFigureOut">
               <a:rPr lang="en-AE" smtClean="0"/>
-              <a:t>09/08/2024</a:t>
+              <a:t>12/08/2024</a:t>
             </a:fld>
             <a:endParaRPr lang="en-AE"/>
           </a:p>
@@ -6757,7 +6758,7 @@
           <a:p>
             <a:fld id="{24070C6D-87F8-C443-B9BB-9ABCDC43E77A}" type="datetimeFigureOut">
               <a:rPr lang="en-AE" smtClean="0"/>
-              <a:t>09/08/2024</a:t>
+              <a:t>12/08/2024</a:t>
             </a:fld>
             <a:endParaRPr lang="en-AE"/>
           </a:p>
@@ -6967,7 +6968,7 @@
           <a:p>
             <a:fld id="{24070C6D-87F8-C443-B9BB-9ABCDC43E77A}" type="datetimeFigureOut">
               <a:rPr lang="en-AE" smtClean="0"/>
-              <a:t>09/08/2024</a:t>
+              <a:t>12/08/2024</a:t>
             </a:fld>
             <a:endParaRPr lang="en-AE"/>
           </a:p>
@@ -7167,7 +7168,7 @@
           <a:p>
             <a:fld id="{24070C6D-87F8-C443-B9BB-9ABCDC43E77A}" type="datetimeFigureOut">
               <a:rPr lang="en-AE" smtClean="0"/>
-              <a:t>09/08/2024</a:t>
+              <a:t>12/08/2024</a:t>
             </a:fld>
             <a:endParaRPr lang="en-AE"/>
           </a:p>
@@ -7443,7 +7444,7 @@
           <a:p>
             <a:fld id="{24070C6D-87F8-C443-B9BB-9ABCDC43E77A}" type="datetimeFigureOut">
               <a:rPr lang="en-AE" smtClean="0"/>
-              <a:t>09/08/2024</a:t>
+              <a:t>12/08/2024</a:t>
             </a:fld>
             <a:endParaRPr lang="en-AE"/>
           </a:p>
@@ -7711,7 +7712,7 @@
           <a:p>
             <a:fld id="{24070C6D-87F8-C443-B9BB-9ABCDC43E77A}" type="datetimeFigureOut">
               <a:rPr lang="en-AE" smtClean="0"/>
-              <a:t>09/08/2024</a:t>
+              <a:t>12/08/2024</a:t>
             </a:fld>
             <a:endParaRPr lang="en-AE"/>
           </a:p>
@@ -8126,7 +8127,7 @@
           <a:p>
             <a:fld id="{24070C6D-87F8-C443-B9BB-9ABCDC43E77A}" type="datetimeFigureOut">
               <a:rPr lang="en-AE" smtClean="0"/>
-              <a:t>09/08/2024</a:t>
+              <a:t>12/08/2024</a:t>
             </a:fld>
             <a:endParaRPr lang="en-AE"/>
           </a:p>
@@ -8268,7 +8269,7 @@
           <a:p>
             <a:fld id="{24070C6D-87F8-C443-B9BB-9ABCDC43E77A}" type="datetimeFigureOut">
               <a:rPr lang="en-AE" smtClean="0"/>
-              <a:t>09/08/2024</a:t>
+              <a:t>12/08/2024</a:t>
             </a:fld>
             <a:endParaRPr lang="en-AE"/>
           </a:p>
@@ -8381,7 +8382,7 @@
           <a:p>
             <a:fld id="{24070C6D-87F8-C443-B9BB-9ABCDC43E77A}" type="datetimeFigureOut">
               <a:rPr lang="en-AE" smtClean="0"/>
-              <a:t>09/08/2024</a:t>
+              <a:t>12/08/2024</a:t>
             </a:fld>
             <a:endParaRPr lang="en-AE"/>
           </a:p>
@@ -8694,7 +8695,7 @@
           <a:p>
             <a:fld id="{24070C6D-87F8-C443-B9BB-9ABCDC43E77A}" type="datetimeFigureOut">
               <a:rPr lang="en-AE" smtClean="0"/>
-              <a:t>09/08/2024</a:t>
+              <a:t>12/08/2024</a:t>
             </a:fld>
             <a:endParaRPr lang="en-AE"/>
           </a:p>
@@ -8983,7 +8984,7 @@
           <a:p>
             <a:fld id="{24070C6D-87F8-C443-B9BB-9ABCDC43E77A}" type="datetimeFigureOut">
               <a:rPr lang="en-AE" smtClean="0"/>
-              <a:t>09/08/2024</a:t>
+              <a:t>12/08/2024</a:t>
             </a:fld>
             <a:endParaRPr lang="en-AE"/>
           </a:p>
@@ -9226,7 +9227,7 @@
           <a:p>
             <a:fld id="{24070C6D-87F8-C443-B9BB-9ABCDC43E77A}" type="datetimeFigureOut">
               <a:rPr lang="en-AE" smtClean="0"/>
-              <a:t>09/08/2024</a:t>
+              <a:t>12/08/2024</a:t>
             </a:fld>
             <a:endParaRPr lang="en-AE"/>
           </a:p>
@@ -10835,7 +10836,7 @@
                 <a:ea typeface="+mj-ea"/>
                 <a:cs typeface="+mj-cs"/>
               </a:rPr>
-              <a:t>Setting up of IAM Account for AWS Bedrock Service - Demo</a:t>
+              <a:t>Setting up of IAM Account for AWS Bedrock Service</a:t>
             </a:r>
             <a:endParaRPr lang="en-US" sz="7200" kern="1200" dirty="0">
               <a:solidFill>
@@ -12840,6 +12841,12 @@
           <a:p>
             <a:r>
               <a:rPr lang="en-AE" sz="2200" dirty="0"/>
+              <a:t>Image Generation - SDXL v1.0 - Playground Example</a:t>
+            </a:r>
+          </a:p>
+          <a:p>
+            <a:r>
+              <a:rPr lang="en-AE" sz="2200" dirty="0"/>
               <a:t>We will be using Llama3.1 model family – 8B, 70B and 405B – state of the art models</a:t>
             </a:r>
           </a:p>
@@ -12853,12 +12860,6 @@
             <a:r>
               <a:rPr lang="en-AE" sz="2200" dirty="0"/>
               <a:t>Use AWS Bedrock Converse API – Basic Streaming Chatbot – Conversational App</a:t>
-            </a:r>
-          </a:p>
-          <a:p>
-            <a:r>
-              <a:rPr lang="en-AE" sz="2200" dirty="0"/>
-              <a:t>Image Generation - SDXL v1.0 - Playground Example</a:t>
             </a:r>
           </a:p>
           <a:p>
@@ -13458,7 +13459,7 @@
           <a:p>
             <a:r>
               <a:rPr lang="en-AE" sz="2000" dirty="0"/>
-              <a:t>Build memory persistent chatbot – using Firebase, Postgresql etc</a:t>
+              <a:t>Build memory persistent chatbot – using AWS DynamoDB, Postgresql etc</a:t>
             </a:r>
           </a:p>
           <a:p>
@@ -14615,6 +14616,145 @@
     <p:extLst>
       <p:ext uri="{BB962C8B-B14F-4D97-AF65-F5344CB8AC3E}">
         <p14:creationId xmlns:p14="http://schemas.microsoft.com/office/powerpoint/2010/main" val="27351503"/>
+      </p:ext>
+    </p:extLst>
+  </p:cSld>
+  <p:clrMapOvr>
+    <a:masterClrMapping/>
+  </p:clrMapOvr>
+</p:sld>
+</file>
+
+<file path=ppt/slides/slide17.xml><?xml version="1.0" encoding="utf-8"?>
+<p:sld xmlns:a="http://schemas.openxmlformats.org/drawingml/2006/main" xmlns:r="http://schemas.openxmlformats.org/officeDocument/2006/relationships" xmlns:p="http://schemas.openxmlformats.org/presentationml/2006/main">
+  <p:cSld>
+    <p:spTree>
+      <p:nvGrpSpPr>
+        <p:cNvPr id="1" name=""/>
+        <p:cNvGrpSpPr/>
+        <p:nvPr/>
+      </p:nvGrpSpPr>
+      <p:grpSpPr>
+        <a:xfrm>
+          <a:off x="0" y="0"/>
+          <a:ext cx="0" cy="0"/>
+          <a:chOff x="0" y="0"/>
+          <a:chExt cx="0" cy="0"/>
+        </a:xfrm>
+      </p:grpSpPr>
+      <p:sp>
+        <p:nvSpPr>
+          <p:cNvPr id="2" name="Title 1">
+            <a:extLst>
+              <a:ext uri="{FF2B5EF4-FFF2-40B4-BE49-F238E27FC236}">
+                <a16:creationId xmlns:a16="http://schemas.microsoft.com/office/drawing/2014/main" id="{48E43647-1CEF-5B56-AB9C-9F3541DA084C}"/>
+              </a:ext>
+            </a:extLst>
+          </p:cNvPr>
+          <p:cNvSpPr>
+            <a:spLocks noGrp="1"/>
+          </p:cNvSpPr>
+          <p:nvPr>
+            <p:ph type="title"/>
+          </p:nvPr>
+        </p:nvSpPr>
+        <p:spPr/>
+        <p:txBody>
+          <a:bodyPr/>
+          <a:lstStyle/>
+          <a:p>
+            <a:r>
+              <a:rPr lang="en-AE" dirty="0"/>
+              <a:t>Download materials</a:t>
+            </a:r>
+          </a:p>
+        </p:txBody>
+      </p:sp>
+      <p:pic>
+        <p:nvPicPr>
+          <p:cNvPr id="5" name="Content Placeholder 4" descr="A qr code on a white background&#10;&#10;Description automatically generated">
+            <a:extLst>
+              <a:ext uri="{FF2B5EF4-FFF2-40B4-BE49-F238E27FC236}">
+                <a16:creationId xmlns:a16="http://schemas.microsoft.com/office/drawing/2014/main" id="{2AD1213D-7700-5580-03EE-3BF0C85BBE9C}"/>
+              </a:ext>
+            </a:extLst>
+          </p:cNvPr>
+          <p:cNvPicPr>
+            <a:picLocks noGrp="1" noChangeAspect="1"/>
+          </p:cNvPicPr>
+          <p:nvPr>
+            <p:ph idx="1"/>
+          </p:nvPr>
+        </p:nvPicPr>
+        <p:blipFill>
+          <a:blip r:embed="rId2"/>
+          <a:stretch>
+            <a:fillRect/>
+          </a:stretch>
+        </p:blipFill>
+        <p:spPr>
+          <a:xfrm>
+            <a:off x="3920331" y="1491517"/>
+            <a:ext cx="4351338" cy="4351338"/>
+          </a:xfrm>
+        </p:spPr>
+      </p:pic>
+      <p:sp>
+        <p:nvSpPr>
+          <p:cNvPr id="6" name="TextBox 5">
+            <a:extLst>
+              <a:ext uri="{FF2B5EF4-FFF2-40B4-BE49-F238E27FC236}">
+                <a16:creationId xmlns:a16="http://schemas.microsoft.com/office/drawing/2014/main" id="{70D26AC8-4E65-D300-01B0-4332E2D025E3}"/>
+              </a:ext>
+            </a:extLst>
+          </p:cNvPr>
+          <p:cNvSpPr txBox="1"/>
+          <p:nvPr/>
+        </p:nvSpPr>
+        <p:spPr>
+          <a:xfrm>
+            <a:off x="3322067" y="5826448"/>
+            <a:ext cx="5547865" cy="369332"/>
+          </a:xfrm>
+          <a:prstGeom prst="rect">
+            <a:avLst/>
+          </a:prstGeom>
+          <a:noFill/>
+        </p:spPr>
+        <p:txBody>
+          <a:bodyPr wrap="none" rtlCol="0">
+            <a:spAutoFit/>
+          </a:bodyPr>
+          <a:lstStyle/>
+          <a:p>
+            <a:r>
+              <a:rPr lang="en-US" dirty="0"/>
+              <a:t>Link: https://</a:t>
+            </a:r>
+            <a:r>
+              <a:rPr lang="en-US" dirty="0" err="1"/>
+              <a:t>github.com</a:t>
+            </a:r>
+            <a:r>
+              <a:rPr lang="en-US" dirty="0"/>
+              <a:t>/di37/</a:t>
+            </a:r>
+            <a:r>
+              <a:rPr lang="en-US" dirty="0" err="1"/>
+              <a:t>aws</a:t>
+            </a:r>
+            <a:r>
+              <a:rPr lang="en-US" dirty="0"/>
+              <a:t>-bedrock-presentation</a:t>
+            </a:r>
+            <a:endParaRPr lang="en-AE" dirty="0"/>
+          </a:p>
+        </p:txBody>
+      </p:sp>
+    </p:spTree>
+    <p:extLst>
+      <p:ext uri="{BB962C8B-B14F-4D97-AF65-F5344CB8AC3E}">
+        <p14:creationId xmlns:p14="http://schemas.microsoft.com/office/powerpoint/2010/main" val="4017994289"/>
       </p:ext>
     </p:extLst>
   </p:cSld>

</xml_diff>